<commit_message>
Minor fixes to PnP Controls slide deck
</commit_message>
<xml_diff>
--- a/03 pnpcontrols.pptx
+++ b/03 pnpcontrols.pptx
@@ -264,7 +264,7 @@
               <a:rPr lang="en-US" smtClean="0">
                 <a:latin typeface="Segoe UI" pitchFamily="34" charset="0"/>
               </a:rPr>
-              <a:t>1/7/19 3:47 PM</a:t>
+              <a:t>3/2/2019 4:57 PM</a:t>
             </a:fld>
             <a:endParaRPr lang="en-US" dirty="0">
               <a:latin typeface="Segoe UI" pitchFamily="34" charset="0"/>
@@ -561,7 +561,7 @@
           <a:p>
             <a:fld id="{D18B56EA-E28F-4F92-9F16-7A6F2501B303}" type="datetime8">
               <a:rPr lang="en-US" smtClean="0"/>
-              <a:t>1/7/19 3:47 PM</a:t>
+              <a:t>3/2/2019 4:57 PM</a:t>
             </a:fld>
             <a:endParaRPr lang="en-US" dirty="0"/>
           </a:p>
@@ -944,7 +944,7 @@
           <a:p>
             <a:fld id="{D18B56EA-E28F-4F92-9F16-7A6F2501B303}" type="datetime8">
               <a:rPr lang="en-US" smtClean="0"/>
-              <a:t>1/7/19 3:47 PM</a:t>
+              <a:t>3/2/2019 4:57 PM</a:t>
             </a:fld>
             <a:endParaRPr lang="en-US" dirty="0"/>
           </a:p>
@@ -1125,7 +1125,7 @@
           <a:p>
             <a:fld id="{D18B56EA-E28F-4F92-9F16-7A6F2501B303}" type="datetime8">
               <a:rPr lang="en-US" smtClean="0"/>
-              <a:t>1/7/19 3:47 PM</a:t>
+              <a:t>3/2/2019 4:57 PM</a:t>
             </a:fld>
             <a:endParaRPr lang="en-US" dirty="0"/>
           </a:p>
@@ -1468,7 +1468,7 @@
           <a:p>
             <a:fld id="{D18B56EA-E28F-4F92-9F16-7A6F2501B303}" type="datetime8">
               <a:rPr lang="en-US" smtClean="0"/>
-              <a:t>1/7/19 3:47 PM</a:t>
+              <a:t>3/2/2019 4:57 PM</a:t>
             </a:fld>
             <a:endParaRPr lang="en-US" dirty="0"/>
           </a:p>
@@ -1649,7 +1649,7 @@
           <a:p>
             <a:fld id="{D18B56EA-E28F-4F92-9F16-7A6F2501B303}" type="datetime8">
               <a:rPr lang="en-US" smtClean="0"/>
-              <a:t>1/7/19 3:47 PM</a:t>
+              <a:t>3/2/2019 4:57 PM</a:t>
             </a:fld>
             <a:endParaRPr lang="en-US" dirty="0"/>
           </a:p>
@@ -1830,7 +1830,7 @@
           <a:p>
             <a:fld id="{D18B56EA-E28F-4F92-9F16-7A6F2501B303}" type="datetime8">
               <a:rPr lang="en-US" smtClean="0"/>
-              <a:t>1/7/19 3:47 PM</a:t>
+              <a:t>3/2/2019 4:57 PM</a:t>
             </a:fld>
             <a:endParaRPr lang="en-US" dirty="0"/>
           </a:p>
@@ -2011,7 +2011,7 @@
           <a:p>
             <a:fld id="{D18B56EA-E28F-4F92-9F16-7A6F2501B303}" type="datetime8">
               <a:rPr lang="en-US" smtClean="0"/>
-              <a:t>1/7/19 3:47 PM</a:t>
+              <a:t>3/2/2019 4:57 PM</a:t>
             </a:fld>
             <a:endParaRPr lang="en-US" dirty="0"/>
           </a:p>
@@ -16970,7 +16970,7 @@
               <a:rPr lang="en-US" sz="1800" dirty="0">
                 <a:latin typeface="+mj-lt"/>
               </a:rPr>
-              <a:t>SharePoint Framework</a:t>
+              <a:t>Overview of the SharePoint Framework</a:t>
             </a:r>
           </a:p>
           <a:p>
@@ -16989,7 +16989,7 @@
                 <a:latin typeface="+mj-lt"/>
                 <a:hlinkClick r:id="rId3"/>
               </a:rPr>
-              <a:t>https://docs.microsoft.com/sharepoint/dev/spfx</a:t>
+              <a:t>https://docs.microsoft.com/sharepoint/dev/spfx/sharepoint-framework-overview</a:t>
             </a:r>
             <a:endParaRPr lang="en-US" sz="1800" dirty="0">
               <a:latin typeface="+mj-lt"/>

</xml_diff>